<commit_message>
Updated diagram function names
</commit_message>
<xml_diff>
--- a/devdoc/img_src/tlsio_state_diagram.pptx
+++ b/devdoc/img_src/tlsio_state_diagram.pptx
@@ -288,7 +288,7 @@
           <a:p>
             <a:fld id="{A1593028-A0CA-48C1-B651-1C34254183FB}" type="datetimeFigureOut">
               <a:rPr lang="en-US" smtClean="0"/>
-              <a:t>5/27/2017</a:t>
+              <a:t>5/31/2017</a:t>
             </a:fld>
             <a:endParaRPr lang="en-US"/>
           </a:p>
@@ -458,7 +458,7 @@
           <a:p>
             <a:fld id="{A1593028-A0CA-48C1-B651-1C34254183FB}" type="datetimeFigureOut">
               <a:rPr lang="en-US" smtClean="0"/>
-              <a:t>5/27/2017</a:t>
+              <a:t>5/31/2017</a:t>
             </a:fld>
             <a:endParaRPr lang="en-US"/>
           </a:p>
@@ -638,7 +638,7 @@
           <a:p>
             <a:fld id="{A1593028-A0CA-48C1-B651-1C34254183FB}" type="datetimeFigureOut">
               <a:rPr lang="en-US" smtClean="0"/>
-              <a:t>5/27/2017</a:t>
+              <a:t>5/31/2017</a:t>
             </a:fld>
             <a:endParaRPr lang="en-US"/>
           </a:p>
@@ -808,7 +808,7 @@
           <a:p>
             <a:fld id="{A1593028-A0CA-48C1-B651-1C34254183FB}" type="datetimeFigureOut">
               <a:rPr lang="en-US" smtClean="0"/>
-              <a:t>5/27/2017</a:t>
+              <a:t>5/31/2017</a:t>
             </a:fld>
             <a:endParaRPr lang="en-US"/>
           </a:p>
@@ -1054,7 +1054,7 @@
           <a:p>
             <a:fld id="{A1593028-A0CA-48C1-B651-1C34254183FB}" type="datetimeFigureOut">
               <a:rPr lang="en-US" smtClean="0"/>
-              <a:t>5/27/2017</a:t>
+              <a:t>5/31/2017</a:t>
             </a:fld>
             <a:endParaRPr lang="en-US"/>
           </a:p>
@@ -1342,7 +1342,7 @@
           <a:p>
             <a:fld id="{A1593028-A0CA-48C1-B651-1C34254183FB}" type="datetimeFigureOut">
               <a:rPr lang="en-US" smtClean="0"/>
-              <a:t>5/27/2017</a:t>
+              <a:t>5/31/2017</a:t>
             </a:fld>
             <a:endParaRPr lang="en-US"/>
           </a:p>
@@ -1769,7 +1769,7 @@
           <a:p>
             <a:fld id="{A1593028-A0CA-48C1-B651-1C34254183FB}" type="datetimeFigureOut">
               <a:rPr lang="en-US" smtClean="0"/>
-              <a:t>5/27/2017</a:t>
+              <a:t>5/31/2017</a:t>
             </a:fld>
             <a:endParaRPr lang="en-US"/>
           </a:p>
@@ -1887,7 +1887,7 @@
           <a:p>
             <a:fld id="{A1593028-A0CA-48C1-B651-1C34254183FB}" type="datetimeFigureOut">
               <a:rPr lang="en-US" smtClean="0"/>
-              <a:t>5/27/2017</a:t>
+              <a:t>5/31/2017</a:t>
             </a:fld>
             <a:endParaRPr lang="en-US"/>
           </a:p>
@@ -1982,7 +1982,7 @@
           <a:p>
             <a:fld id="{A1593028-A0CA-48C1-B651-1C34254183FB}" type="datetimeFigureOut">
               <a:rPr lang="en-US" smtClean="0"/>
-              <a:t>5/27/2017</a:t>
+              <a:t>5/31/2017</a:t>
             </a:fld>
             <a:endParaRPr lang="en-US"/>
           </a:p>
@@ -2259,7 +2259,7 @@
           <a:p>
             <a:fld id="{A1593028-A0CA-48C1-B651-1C34254183FB}" type="datetimeFigureOut">
               <a:rPr lang="en-US" smtClean="0"/>
-              <a:t>5/27/2017</a:t>
+              <a:t>5/31/2017</a:t>
             </a:fld>
             <a:endParaRPr lang="en-US"/>
           </a:p>
@@ -2512,7 +2512,7 @@
           <a:p>
             <a:fld id="{A1593028-A0CA-48C1-B651-1C34254183FB}" type="datetimeFigureOut">
               <a:rPr lang="en-US" smtClean="0"/>
-              <a:t>5/27/2017</a:t>
+              <a:t>5/31/2017</a:t>
             </a:fld>
             <a:endParaRPr lang="en-US"/>
           </a:p>
@@ -2725,7 +2725,7 @@
           <a:p>
             <a:fld id="{A1593028-A0CA-48C1-B651-1C34254183FB}" type="datetimeFigureOut">
               <a:rPr lang="en-US" smtClean="0"/>
-              <a:t>5/27/2017</a:t>
+              <a:t>5/31/2017</a:t>
             </a:fld>
             <a:endParaRPr lang="en-US"/>
           </a:p>
@@ -3645,8 +3645,8 @@
         </p:nvSpPr>
         <p:spPr>
           <a:xfrm>
-            <a:off x="762000" y="750397"/>
-            <a:ext cx="1440601" cy="324615"/>
+            <a:off x="457200" y="750397"/>
+            <a:ext cx="1782041" cy="324615"/>
           </a:xfrm>
           <a:prstGeom prst="rect">
             <a:avLst/>
@@ -3665,7 +3665,7 @@
             </a:r>
             <a:r>
               <a:rPr lang="en-US" sz="1200" dirty="0" err="1" smtClean="0"/>
-              <a:t>dowork</a:t>
+              <a:t>tlsio_dowork</a:t>
             </a:r>
             <a:r>
               <a:rPr lang="en-US" sz="1200" dirty="0" smtClean="0"/>
@@ -3748,8 +3748,8 @@
         </p:nvSpPr>
         <p:spPr>
           <a:xfrm>
-            <a:off x="983207" y="2132279"/>
-            <a:ext cx="598897" cy="324615"/>
+            <a:off x="838200" y="2132279"/>
+            <a:ext cx="828126" cy="293838"/>
           </a:xfrm>
           <a:prstGeom prst="rect">
             <a:avLst/>
@@ -3763,9 +3763,10 @@
           <a:lstStyle/>
           <a:p>
             <a:r>
-              <a:rPr lang="en-US" sz="1200" dirty="0"/>
-              <a:t>open</a:t>
-            </a:r>
+              <a:rPr lang="en-US" sz="1000" dirty="0" err="1" smtClean="0"/>
+              <a:t>tlsio_open</a:t>
+            </a:r>
+            <a:endParaRPr lang="en-US" sz="1000" dirty="0"/>
           </a:p>
         </p:txBody>
       </p:sp>
@@ -3777,8 +3778,8 @@
         </p:nvSpPr>
         <p:spPr>
           <a:xfrm>
-            <a:off x="2585030" y="2132279"/>
-            <a:ext cx="755607" cy="324615"/>
+            <a:off x="2471030" y="2133600"/>
+            <a:ext cx="957970" cy="293838"/>
           </a:xfrm>
           <a:prstGeom prst="rect">
             <a:avLst/>
@@ -3792,10 +3793,10 @@
           <a:lstStyle/>
           <a:p>
             <a:r>
-              <a:rPr lang="en-US" sz="1200" dirty="0" err="1" smtClean="0"/>
-              <a:t>dowork</a:t>
-            </a:r>
-            <a:endParaRPr lang="en-US" sz="1200" dirty="0"/>
+              <a:rPr lang="en-US" sz="1000" dirty="0" err="1" smtClean="0"/>
+              <a:t>tlsio_dowork</a:t>
+            </a:r>
+            <a:endParaRPr lang="en-US" sz="1000" dirty="0"/>
           </a:p>
         </p:txBody>
       </p:sp>
@@ -3808,7 +3809,7 @@
         <p:spPr>
           <a:xfrm>
             <a:off x="5652655" y="1065479"/>
-            <a:ext cx="755607" cy="324615"/>
+            <a:ext cx="957970" cy="293838"/>
           </a:xfrm>
           <a:prstGeom prst="rect">
             <a:avLst/>
@@ -3822,10 +3823,10 @@
           <a:lstStyle/>
           <a:p>
             <a:r>
-              <a:rPr lang="en-US" sz="1200" dirty="0" err="1"/>
-              <a:t>dowork</a:t>
-            </a:r>
-            <a:endParaRPr lang="en-US" sz="1200" dirty="0"/>
+              <a:rPr lang="en-US" sz="1000" dirty="0" err="1" smtClean="0"/>
+              <a:t>tlsio_dowork</a:t>
+            </a:r>
+            <a:endParaRPr lang="en-US" sz="1000" dirty="0"/>
           </a:p>
         </p:txBody>
       </p:sp>
@@ -3838,7 +3839,7 @@
         <p:spPr>
           <a:xfrm>
             <a:off x="4187250" y="2132279"/>
-            <a:ext cx="600500" cy="324615"/>
+            <a:ext cx="826523" cy="293838"/>
           </a:xfrm>
           <a:prstGeom prst="rect">
             <a:avLst/>
@@ -3852,9 +3853,10 @@
           <a:lstStyle/>
           <a:p>
             <a:r>
-              <a:rPr lang="en-US" sz="1200" dirty="0"/>
-              <a:t>close</a:t>
-            </a:r>
+              <a:rPr lang="en-US" sz="1000" dirty="0" err="1" smtClean="0"/>
+              <a:t>tlsio_close</a:t>
+            </a:r>
+            <a:endParaRPr lang="en-US" sz="1000" dirty="0"/>
           </a:p>
         </p:txBody>
       </p:sp>
@@ -4001,8 +4003,8 @@
         </p:nvSpPr>
         <p:spPr>
           <a:xfrm>
-            <a:off x="4211782" y="1065479"/>
-            <a:ext cx="600500" cy="324615"/>
+            <a:off x="3962400" y="1065479"/>
+            <a:ext cx="826523" cy="293838"/>
           </a:xfrm>
           <a:prstGeom prst="rect">
             <a:avLst/>
@@ -4016,9 +4018,10 @@
           <a:lstStyle/>
           <a:p>
             <a:r>
-              <a:rPr lang="en-US" sz="1200" dirty="0"/>
-              <a:t>close</a:t>
-            </a:r>
+              <a:rPr lang="en-US" sz="1000" dirty="0" err="1" smtClean="0"/>
+              <a:t>tlsio_close</a:t>
+            </a:r>
+            <a:endParaRPr lang="en-US" sz="1000" dirty="0"/>
           </a:p>
         </p:txBody>
       </p:sp>
@@ -4129,8 +4132,8 @@
         </p:nvSpPr>
         <p:spPr>
           <a:xfrm>
-            <a:off x="1727201" y="2701288"/>
-            <a:ext cx="755607" cy="324615"/>
+            <a:off x="1600200" y="2754162"/>
+            <a:ext cx="957970" cy="293838"/>
           </a:xfrm>
           <a:prstGeom prst="rect">
             <a:avLst/>
@@ -4144,10 +4147,10 @@
           <a:lstStyle/>
           <a:p>
             <a:r>
-              <a:rPr lang="en-US" sz="1200" dirty="0" err="1" smtClean="0"/>
-              <a:t>dowork</a:t>
-            </a:r>
-            <a:endParaRPr lang="en-US" sz="1200" dirty="0"/>
+              <a:rPr lang="en-US" sz="1000" dirty="0" err="1"/>
+              <a:t>tlsio_dowork</a:t>
+            </a:r>
+            <a:endParaRPr lang="en-US" sz="1000" dirty="0"/>
           </a:p>
         </p:txBody>
       </p:sp>
@@ -4258,8 +4261,8 @@
         </p:nvSpPr>
         <p:spPr>
           <a:xfrm>
-            <a:off x="3740193" y="4602799"/>
-            <a:ext cx="755607" cy="324615"/>
+            <a:off x="3657600" y="4648200"/>
+            <a:ext cx="957970" cy="293838"/>
           </a:xfrm>
           <a:prstGeom prst="rect">
             <a:avLst/>
@@ -4273,10 +4276,10 @@
           <a:lstStyle/>
           <a:p>
             <a:r>
-              <a:rPr lang="en-US" sz="1200" dirty="0" err="1" smtClean="0"/>
-              <a:t>dowork</a:t>
-            </a:r>
-            <a:endParaRPr lang="en-US" sz="1200" dirty="0"/>
+              <a:rPr lang="en-US" sz="1000" dirty="0" err="1"/>
+              <a:t>tlsio_dowork</a:t>
+            </a:r>
+            <a:endParaRPr lang="en-US" sz="1000" dirty="0"/>
           </a:p>
         </p:txBody>
       </p:sp>
@@ -4387,8 +4390,8 @@
         </p:nvSpPr>
         <p:spPr>
           <a:xfrm>
-            <a:off x="152400" y="2697799"/>
-            <a:ext cx="755607" cy="324615"/>
+            <a:off x="76200" y="2754162"/>
+            <a:ext cx="957970" cy="293838"/>
           </a:xfrm>
           <a:prstGeom prst="rect">
             <a:avLst/>
@@ -4402,10 +4405,10 @@
           <a:lstStyle/>
           <a:p>
             <a:r>
-              <a:rPr lang="en-US" sz="1200" dirty="0" err="1" smtClean="0"/>
-              <a:t>dowork</a:t>
-            </a:r>
-            <a:endParaRPr lang="en-US" sz="1200" dirty="0"/>
+              <a:rPr lang="en-US" sz="1000" dirty="0" err="1"/>
+              <a:t>tlsio_dowork</a:t>
+            </a:r>
+            <a:endParaRPr lang="en-US" sz="1000" dirty="0"/>
           </a:p>
         </p:txBody>
       </p:sp>
@@ -4516,8 +4519,8 @@
         </p:nvSpPr>
         <p:spPr>
           <a:xfrm>
-            <a:off x="3359193" y="2697799"/>
-            <a:ext cx="755607" cy="324615"/>
+            <a:off x="3156830" y="2754162"/>
+            <a:ext cx="957970" cy="293838"/>
           </a:xfrm>
           <a:prstGeom prst="rect">
             <a:avLst/>
@@ -4531,10 +4534,10 @@
           <a:lstStyle/>
           <a:p>
             <a:r>
-              <a:rPr lang="en-US" sz="1200" dirty="0" err="1" smtClean="0"/>
-              <a:t>dowork</a:t>
-            </a:r>
-            <a:endParaRPr lang="en-US" sz="1200" dirty="0"/>
+              <a:rPr lang="en-US" sz="1000" dirty="0" err="1"/>
+              <a:t>tlsio_dowork</a:t>
+            </a:r>
+            <a:endParaRPr lang="en-US" sz="1000" dirty="0"/>
           </a:p>
         </p:txBody>
       </p:sp>
@@ -4774,8 +4777,8 @@
         </p:nvSpPr>
         <p:spPr>
           <a:xfrm>
-            <a:off x="6483393" y="2697799"/>
-            <a:ext cx="755607" cy="324615"/>
+            <a:off x="6324600" y="2723385"/>
+            <a:ext cx="957970" cy="293838"/>
           </a:xfrm>
           <a:prstGeom prst="rect">
             <a:avLst/>
@@ -4789,10 +4792,10 @@
           <a:lstStyle/>
           <a:p>
             <a:r>
-              <a:rPr lang="en-US" sz="1200" dirty="0" err="1" smtClean="0"/>
-              <a:t>dowork</a:t>
-            </a:r>
-            <a:endParaRPr lang="en-US" sz="1200" dirty="0"/>
+              <a:rPr lang="en-US" sz="1000" dirty="0" err="1"/>
+              <a:t>tlsio_dowork</a:t>
+            </a:r>
+            <a:endParaRPr lang="en-US" sz="1000" dirty="0"/>
           </a:p>
         </p:txBody>
       </p:sp>
@@ -4840,7 +4843,7 @@
         <p:spPr>
           <a:xfrm>
             <a:off x="4581100" y="4037279"/>
-            <a:ext cx="600500" cy="324615"/>
+            <a:ext cx="826523" cy="293838"/>
           </a:xfrm>
           <a:prstGeom prst="rect">
             <a:avLst/>
@@ -4854,9 +4857,10 @@
           <a:lstStyle/>
           <a:p>
             <a:r>
-              <a:rPr lang="en-US" sz="1200" dirty="0"/>
-              <a:t>close</a:t>
-            </a:r>
+              <a:rPr lang="en-US" sz="1000" dirty="0" err="1" smtClean="0"/>
+              <a:t>tlsio_close</a:t>
+            </a:r>
+            <a:endParaRPr lang="en-US" sz="1000" dirty="0"/>
           </a:p>
         </p:txBody>
       </p:sp>

</xml_diff>